<commit_message>
Second update - why can't I put this in a branch?
</commit_message>
<xml_diff>
--- a/Database.pptx
+++ b/Database.pptx
@@ -536,15 +536,15 @@
           <a:p>
             <a:r>
               <a:rPr lang="en-US" dirty="0" smtClean="0"/>
-              <a:t>I </a:t>
+              <a:t>I think it looks good.</a:t>
             </a:r>
             <a:r>
-              <a:rPr lang="en-US" smtClean="0"/>
-              <a:t>think it looks good.</a:t>
+              <a:rPr lang="en-US" baseline="0" dirty="0" smtClean="0"/>
+              <a:t> </a:t>
             </a:r>
             <a:r>
               <a:rPr lang="en-US" baseline="0" smtClean="0"/>
-              <a:t> </a:t>
+              <a:t>– Brandon for Brandon’s branch</a:t>
             </a:r>
             <a:endParaRPr lang="en-US"/>
           </a:p>

</xml_diff>

<commit_message>
updated to new database
</commit_message>
<xml_diff>
--- a/Database.pptx
+++ b/Database.pptx
@@ -109,7 +109,7 @@
   </p:defaultTextStyle>
   <p:extLst>
     <p:ext uri="{EFAFB233-063F-42B5-8137-9DF3F51BA10A}">
-      <p15:sldGuideLst xmlns:p15="http://schemas.microsoft.com/office/powerpoint/2012/main">
+      <p15:sldGuideLst xmlns:p15="http://schemas.microsoft.com/office/powerpoint/2012/main" xmlns="">
         <p15:guide id="1" orient="horz" pos="4320">
           <p15:clr>
             <a:srgbClr val="A4A3A4"/>
@@ -123,7 +123,7 @@
       </p15:sldGuideLst>
     </p:ext>
     <p:ext uri="{2D200454-40CA-4A62-9FC3-DE9A4176ACB9}">
-      <p15:notesGuideLst xmlns:p15="http://schemas.microsoft.com/office/powerpoint/2012/main">
+      <p15:notesGuideLst xmlns:p15="http://schemas.microsoft.com/office/powerpoint/2012/main" xmlns="">
         <p15:guide id="1" orient="horz" pos="2880">
           <p15:clr>
             <a:srgbClr val="A4A3A4"/>
@@ -222,7 +222,7 @@
           <a:p>
             <a:fld id="{536367A4-3F60-4437-B7A9-5172662816B4}" type="datetimeFigureOut">
               <a:rPr lang="en-US" smtClean="0"/>
-              <a:t>8/12/15</a:t>
+              <a:t>8/12/2015</a:t>
             </a:fld>
             <a:endParaRPr lang="en-US"/>
           </a:p>
@@ -767,7 +767,7 @@
           <a:p>
             <a:fld id="{9AF287DD-F15B-4D4E-B59E-FE1D972C285C}" type="datetimeFigureOut">
               <a:rPr lang="en-US" smtClean="0"/>
-              <a:t>8/12/15</a:t>
+              <a:t>8/12/2015</a:t>
             </a:fld>
             <a:endParaRPr lang="en-US"/>
           </a:p>
@@ -937,7 +937,7 @@
           <a:p>
             <a:fld id="{9AF287DD-F15B-4D4E-B59E-FE1D972C285C}" type="datetimeFigureOut">
               <a:rPr lang="en-US" smtClean="0"/>
-              <a:t>8/12/15</a:t>
+              <a:t>8/12/2015</a:t>
             </a:fld>
             <a:endParaRPr lang="en-US"/>
           </a:p>
@@ -1117,7 +1117,7 @@
           <a:p>
             <a:fld id="{9AF287DD-F15B-4D4E-B59E-FE1D972C285C}" type="datetimeFigureOut">
               <a:rPr lang="en-US" smtClean="0"/>
-              <a:t>8/12/15</a:t>
+              <a:t>8/12/2015</a:t>
             </a:fld>
             <a:endParaRPr lang="en-US"/>
           </a:p>
@@ -1287,7 +1287,7 @@
           <a:p>
             <a:fld id="{9AF287DD-F15B-4D4E-B59E-FE1D972C285C}" type="datetimeFigureOut">
               <a:rPr lang="en-US" smtClean="0"/>
-              <a:t>8/12/15</a:t>
+              <a:t>8/12/2015</a:t>
             </a:fld>
             <a:endParaRPr lang="en-US"/>
           </a:p>
@@ -1533,7 +1533,7 @@
           <a:p>
             <a:fld id="{9AF287DD-F15B-4D4E-B59E-FE1D972C285C}" type="datetimeFigureOut">
               <a:rPr lang="en-US" smtClean="0"/>
-              <a:t>8/12/15</a:t>
+              <a:t>8/12/2015</a:t>
             </a:fld>
             <a:endParaRPr lang="en-US"/>
           </a:p>
@@ -1821,7 +1821,7 @@
           <a:p>
             <a:fld id="{9AF287DD-F15B-4D4E-B59E-FE1D972C285C}" type="datetimeFigureOut">
               <a:rPr lang="en-US" smtClean="0"/>
-              <a:t>8/12/15</a:t>
+              <a:t>8/12/2015</a:t>
             </a:fld>
             <a:endParaRPr lang="en-US"/>
           </a:p>
@@ -2243,7 +2243,7 @@
           <a:p>
             <a:fld id="{9AF287DD-F15B-4D4E-B59E-FE1D972C285C}" type="datetimeFigureOut">
               <a:rPr lang="en-US" smtClean="0"/>
-              <a:t>8/12/15</a:t>
+              <a:t>8/12/2015</a:t>
             </a:fld>
             <a:endParaRPr lang="en-US"/>
           </a:p>
@@ -2361,7 +2361,7 @@
           <a:p>
             <a:fld id="{9AF287DD-F15B-4D4E-B59E-FE1D972C285C}" type="datetimeFigureOut">
               <a:rPr lang="en-US" smtClean="0"/>
-              <a:t>8/12/15</a:t>
+              <a:t>8/12/2015</a:t>
             </a:fld>
             <a:endParaRPr lang="en-US"/>
           </a:p>
@@ -2456,7 +2456,7 @@
           <a:p>
             <a:fld id="{9AF287DD-F15B-4D4E-B59E-FE1D972C285C}" type="datetimeFigureOut">
               <a:rPr lang="en-US" smtClean="0"/>
-              <a:t>8/12/15</a:t>
+              <a:t>8/12/2015</a:t>
             </a:fld>
             <a:endParaRPr lang="en-US"/>
           </a:p>
@@ -2733,7 +2733,7 @@
           <a:p>
             <a:fld id="{9AF287DD-F15B-4D4E-B59E-FE1D972C285C}" type="datetimeFigureOut">
               <a:rPr lang="en-US" smtClean="0"/>
-              <a:t>8/12/15</a:t>
+              <a:t>8/12/2015</a:t>
             </a:fld>
             <a:endParaRPr lang="en-US"/>
           </a:p>
@@ -2986,7 +2986,7 @@
           <a:p>
             <a:fld id="{9AF287DD-F15B-4D4E-B59E-FE1D972C285C}" type="datetimeFigureOut">
               <a:rPr lang="en-US" smtClean="0"/>
-              <a:t>8/12/15</a:t>
+              <a:t>8/12/2015</a:t>
             </a:fld>
             <a:endParaRPr lang="en-US"/>
           </a:p>
@@ -3199,7 +3199,7 @@
           <a:p>
             <a:fld id="{9AF287DD-F15B-4D4E-B59E-FE1D972C285C}" type="datetimeFigureOut">
               <a:rPr lang="en-US" smtClean="0"/>
-              <a:t>8/12/15</a:t>
+              <a:t>8/12/2015</a:t>
             </a:fld>
             <a:endParaRPr lang="en-US"/>
           </a:p>
@@ -7955,7 +7955,7 @@
         </p:nvGrpSpPr>
         <p:grpSpPr>
           <a:xfrm>
-            <a:off x="10604500" y="6161012"/>
+            <a:off x="10605835" y="5907046"/>
             <a:ext cx="1905000" cy="595538"/>
             <a:chOff x="304800" y="282766"/>
             <a:chExt cx="1905000" cy="595538"/>
@@ -8206,9 +8206,9 @@
         <p:grpSpPr>
           <a:xfrm>
             <a:off x="13106400" y="3094110"/>
-            <a:ext cx="2286000" cy="3411881"/>
+            <a:ext cx="2286000" cy="3497156"/>
             <a:chOff x="304800" y="282766"/>
-            <a:chExt cx="2286000" cy="3201234"/>
+            <a:chExt cx="2286000" cy="3281244"/>
           </a:xfrm>
         </p:grpSpPr>
         <p:sp>
@@ -8220,7 +8220,7 @@
           <p:spPr>
             <a:xfrm>
               <a:off x="304800" y="497303"/>
-              <a:ext cx="2286000" cy="2986697"/>
+              <a:ext cx="2286000" cy="3066707"/>
             </a:xfrm>
             <a:prstGeom prst="rect">
               <a:avLst/>
@@ -8295,8 +8295,23 @@
               </a:r>
               <a:r>
                 <a:rPr lang="en-US" sz="1200" dirty="0" smtClean="0"/>
+                <a:t> VARCHAR(50</a:t>
+              </a:r>
+              <a:r>
+                <a:rPr lang="en-US" sz="1200" dirty="0" smtClean="0"/>
+                <a:t>)</a:t>
+              </a:r>
+            </a:p>
+            <a:p>
+              <a:r>
+                <a:rPr lang="en-US" sz="1200" dirty="0" err="1" smtClean="0"/>
+                <a:t>heareab</a:t>
+              </a:r>
+              <a:r>
+                <a:rPr lang="en-US" sz="1200" dirty="0" smtClean="0"/>
                 <a:t> VARCHAR(50)</a:t>
               </a:r>
+              <a:endParaRPr lang="en-US" sz="1200" dirty="0" smtClean="0"/>
             </a:p>
             <a:p>
               <a:r>
@@ -8852,7 +8867,7 @@
         </p:nvCxnSpPr>
         <p:spPr>
           <a:xfrm flipV="1">
-            <a:off x="12509500" y="6006502"/>
+            <a:off x="12510835" y="5752536"/>
             <a:ext cx="596900" cy="559548"/>
           </a:xfrm>
           <a:prstGeom prst="bentConnector3">
@@ -8889,8 +8904,8 @@
         </p:nvCxnSpPr>
         <p:spPr>
           <a:xfrm rot="10800000">
-            <a:off x="15011400" y="6505991"/>
-            <a:ext cx="1066800" cy="1408412"/>
+            <a:off x="15011400" y="6591267"/>
+            <a:ext cx="1066801" cy="1323137"/>
           </a:xfrm>
           <a:prstGeom prst="bentConnector2">
             <a:avLst/>
@@ -9255,8 +9270,8 @@
         </p:nvCxnSpPr>
         <p:spPr>
           <a:xfrm rot="5400000">
-            <a:off x="13376425" y="6839216"/>
-            <a:ext cx="1206201" cy="539750"/>
+            <a:off x="13419062" y="6881854"/>
+            <a:ext cx="1120926" cy="539750"/>
           </a:xfrm>
           <a:prstGeom prst="bentConnector3">
             <a:avLst>
@@ -9626,6 +9641,166 @@
           <a:xfrm rot="5400000" flipH="1" flipV="1">
             <a:off x="14119301" y="2281387"/>
             <a:ext cx="942822" cy="682625"/>
+          </a:xfrm>
+          <a:prstGeom prst="bentConnector3">
+            <a:avLst>
+              <a:gd name="adj1" fmla="val 50000"/>
+            </a:avLst>
+          </a:prstGeom>
+          <a:ln>
+            <a:tailEnd type="arrow"/>
+          </a:ln>
+        </p:spPr>
+        <p:style>
+          <a:lnRef idx="1">
+            <a:schemeClr val="accent1"/>
+          </a:lnRef>
+          <a:fillRef idx="0">
+            <a:schemeClr val="accent1"/>
+          </a:fillRef>
+          <a:effectRef idx="0">
+            <a:schemeClr val="accent1"/>
+          </a:effectRef>
+          <a:fontRef idx="minor">
+            <a:schemeClr val="tx1"/>
+          </a:fontRef>
+        </p:style>
+      </p:cxnSp>
+      <p:grpSp>
+        <p:nvGrpSpPr>
+          <p:cNvPr id="189" name="Group 188"/>
+          <p:cNvGrpSpPr/>
+          <p:nvPr/>
+        </p:nvGrpSpPr>
+        <p:grpSpPr>
+          <a:xfrm>
+            <a:off x="10363200" y="6629400"/>
+            <a:ext cx="2195766" cy="640406"/>
+            <a:chOff x="304799" y="237898"/>
+            <a:chExt cx="2195766" cy="640406"/>
+          </a:xfrm>
+        </p:grpSpPr>
+        <p:sp>
+          <p:nvSpPr>
+            <p:cNvPr id="191" name="Rectangle 190"/>
+            <p:cNvSpPr/>
+            <p:nvPr/>
+          </p:nvSpPr>
+          <p:spPr>
+            <a:xfrm>
+              <a:off x="304799" y="497304"/>
+              <a:ext cx="2195766" cy="381000"/>
+            </a:xfrm>
+            <a:prstGeom prst="rect">
+              <a:avLst/>
+            </a:prstGeom>
+          </p:spPr>
+          <p:style>
+            <a:lnRef idx="2">
+              <a:schemeClr val="accent1">
+                <a:shade val="50000"/>
+              </a:schemeClr>
+            </a:lnRef>
+            <a:fillRef idx="1">
+              <a:schemeClr val="accent1"/>
+            </a:fillRef>
+            <a:effectRef idx="0">
+              <a:schemeClr val="accent1"/>
+            </a:effectRef>
+            <a:fontRef idx="minor">
+              <a:schemeClr val="lt1"/>
+            </a:fontRef>
+          </p:style>
+          <p:txBody>
+            <a:bodyPr rtlCol="0" anchor="ctr"/>
+            <a:lstStyle/>
+            <a:p>
+              <a:r>
+                <a:rPr lang="en-US" sz="1200" dirty="0" err="1" smtClean="0"/>
+                <a:t>transportmethodid</a:t>
+              </a:r>
+              <a:r>
+                <a:rPr lang="en-US" sz="1200" dirty="0" smtClean="0"/>
+                <a:t> </a:t>
+              </a:r>
+              <a:r>
+                <a:rPr lang="en-US" sz="1200" dirty="0"/>
+                <a:t>BIGINT</a:t>
+              </a:r>
+            </a:p>
+            <a:p>
+              <a:r>
+                <a:rPr lang="en-US" sz="1200" dirty="0" err="1" smtClean="0"/>
+                <a:t>Transportmethod</a:t>
+              </a:r>
+              <a:r>
+                <a:rPr lang="en-US" sz="1200" dirty="0" smtClean="0"/>
+                <a:t> VARCHAR(50</a:t>
+              </a:r>
+              <a:r>
+                <a:rPr lang="en-US" sz="1200" dirty="0"/>
+                <a:t>) </a:t>
+              </a:r>
+            </a:p>
+          </p:txBody>
+        </p:sp>
+        <p:sp>
+          <p:nvSpPr>
+            <p:cNvPr id="192" name="Rectangle 191"/>
+            <p:cNvSpPr/>
+            <p:nvPr/>
+          </p:nvSpPr>
+          <p:spPr>
+            <a:xfrm>
+              <a:off x="304799" y="237898"/>
+              <a:ext cx="2195765" cy="259406"/>
+            </a:xfrm>
+            <a:prstGeom prst="rect">
+              <a:avLst/>
+            </a:prstGeom>
+            <a:solidFill>
+              <a:srgbClr val="00B050"/>
+            </a:solidFill>
+          </p:spPr>
+          <p:style>
+            <a:lnRef idx="2">
+              <a:schemeClr val="accent1">
+                <a:shade val="50000"/>
+              </a:schemeClr>
+            </a:lnRef>
+            <a:fillRef idx="1">
+              <a:schemeClr val="accent1"/>
+            </a:fillRef>
+            <a:effectRef idx="0">
+              <a:schemeClr val="accent1"/>
+            </a:effectRef>
+            <a:fontRef idx="minor">
+              <a:schemeClr val="lt1"/>
+            </a:fontRef>
+          </p:style>
+          <p:txBody>
+            <a:bodyPr rtlCol="0" anchor="ctr"/>
+            <a:lstStyle/>
+            <a:p>
+              <a:r>
+                <a:rPr lang="en-US" sz="1400" dirty="0" err="1" smtClean="0"/>
+                <a:t>TransportMethod</a:t>
+              </a:r>
+              <a:endParaRPr lang="en-US" sz="1400" dirty="0"/>
+            </a:p>
+          </p:txBody>
+        </p:sp>
+      </p:grpSp>
+      <p:cxnSp>
+        <p:nvCxnSpPr>
+          <p:cNvPr id="193" name="Elbow Connector 192"/>
+          <p:cNvCxnSpPr/>
+          <p:nvPr/>
+        </p:nvCxnSpPr>
+        <p:spPr>
+          <a:xfrm flipV="1">
+            <a:off x="12496800" y="6359763"/>
+            <a:ext cx="596900" cy="559548"/>
           </a:xfrm>
           <a:prstGeom prst="bentConnector3">
             <a:avLst>

</xml_diff>

<commit_message>
updates at end of 2 weeks
</commit_message>
<xml_diff>
--- a/Database.pptx
+++ b/Database.pptx
@@ -109,7 +109,7 @@
   </p:defaultTextStyle>
   <p:extLst>
     <p:ext uri="{EFAFB233-063F-42B5-8137-9DF3F51BA10A}">
-      <p15:sldGuideLst xmlns="" xmlns:p15="http://schemas.microsoft.com/office/powerpoint/2012/main">
+      <p15:sldGuideLst xmlns:p15="http://schemas.microsoft.com/office/powerpoint/2012/main" xmlns="">
         <p15:guide id="1" orient="horz" pos="4320">
           <p15:clr>
             <a:srgbClr val="A4A3A4"/>
@@ -123,7 +123,7 @@
       </p15:sldGuideLst>
     </p:ext>
     <p:ext uri="{2D200454-40CA-4A62-9FC3-DE9A4176ACB9}">
-      <p15:notesGuideLst xmlns="" xmlns:p15="http://schemas.microsoft.com/office/powerpoint/2012/main">
+      <p15:notesGuideLst xmlns:p15="http://schemas.microsoft.com/office/powerpoint/2012/main" xmlns="">
         <p15:guide id="1" orient="horz" pos="2880">
           <p15:clr>
             <a:srgbClr val="A4A3A4"/>
@@ -6031,7 +6031,7 @@
         </p:nvGrpSpPr>
         <p:grpSpPr>
           <a:xfrm>
-            <a:off x="5079332" y="609600"/>
+            <a:off x="5950875" y="397327"/>
             <a:ext cx="1993230" cy="595538"/>
             <a:chOff x="304800" y="282766"/>
             <a:chExt cx="1993230" cy="595538"/>
@@ -6161,7 +6161,7 @@
         </p:nvGrpSpPr>
         <p:grpSpPr>
           <a:xfrm>
-            <a:off x="2835547" y="609600"/>
+            <a:off x="3663617" y="401180"/>
             <a:ext cx="1993230" cy="595538"/>
             <a:chOff x="304800" y="282766"/>
             <a:chExt cx="1993230" cy="595538"/>
@@ -6463,136 +6463,6 @@
           </p:txBody>
         </p:sp>
       </p:grpSp>
-      <p:grpSp>
-        <p:nvGrpSpPr>
-          <p:cNvPr id="175" name="Group 174"/>
-          <p:cNvGrpSpPr/>
-          <p:nvPr/>
-        </p:nvGrpSpPr>
-        <p:grpSpPr>
-          <a:xfrm>
-            <a:off x="7587915" y="609600"/>
-            <a:ext cx="1993230" cy="595538"/>
-            <a:chOff x="304800" y="282766"/>
-            <a:chExt cx="1993230" cy="595538"/>
-          </a:xfrm>
-        </p:grpSpPr>
-        <p:sp>
-          <p:nvSpPr>
-            <p:cNvPr id="176" name="Rectangle 175"/>
-            <p:cNvSpPr/>
-            <p:nvPr/>
-          </p:nvSpPr>
-          <p:spPr>
-            <a:xfrm>
-              <a:off x="304800" y="497304"/>
-              <a:ext cx="1993230" cy="381000"/>
-            </a:xfrm>
-            <a:prstGeom prst="rect">
-              <a:avLst/>
-            </a:prstGeom>
-          </p:spPr>
-          <p:style>
-            <a:lnRef idx="2">
-              <a:schemeClr val="accent1">
-                <a:shade val="50000"/>
-              </a:schemeClr>
-            </a:lnRef>
-            <a:fillRef idx="1">
-              <a:schemeClr val="accent1"/>
-            </a:fillRef>
-            <a:effectRef idx="0">
-              <a:schemeClr val="accent1"/>
-            </a:effectRef>
-            <a:fontRef idx="minor">
-              <a:schemeClr val="lt1"/>
-            </a:fontRef>
-          </p:style>
-          <p:txBody>
-            <a:bodyPr rtlCol="0" anchor="ctr"/>
-            <a:lstStyle/>
-            <a:p>
-              <a:r>
-                <a:rPr lang="en-US" sz="1200" dirty="0" err="1" smtClean="0"/>
-                <a:t>dayofvisitid</a:t>
-              </a:r>
-              <a:r>
-                <a:rPr lang="en-US" sz="1200" dirty="0" smtClean="0"/>
-                <a:t> </a:t>
-              </a:r>
-              <a:r>
-                <a:rPr lang="en-US" sz="1200" dirty="0"/>
-                <a:t>BIGINT</a:t>
-              </a:r>
-            </a:p>
-            <a:p>
-              <a:r>
-                <a:rPr lang="en-US" sz="1200" dirty="0" err="1" smtClean="0"/>
-                <a:t>dayofvisit</a:t>
-              </a:r>
-              <a:r>
-                <a:rPr lang="en-US" sz="1200" dirty="0" smtClean="0"/>
-                <a:t> </a:t>
-              </a:r>
-              <a:r>
-                <a:rPr lang="en-US" sz="1200" dirty="0"/>
-                <a:t>VARCHAR(50</a:t>
-              </a:r>
-              <a:r>
-                <a:rPr lang="en-US" sz="1200" dirty="0" smtClean="0"/>
-                <a:t>) </a:t>
-              </a:r>
-              <a:endParaRPr lang="en-US" sz="1200" dirty="0"/>
-            </a:p>
-          </p:txBody>
-        </p:sp>
-        <p:sp>
-          <p:nvSpPr>
-            <p:cNvPr id="177" name="Rectangle 176"/>
-            <p:cNvSpPr/>
-            <p:nvPr/>
-          </p:nvSpPr>
-          <p:spPr>
-            <a:xfrm>
-              <a:off x="304800" y="282766"/>
-              <a:ext cx="1993230" cy="214538"/>
-            </a:xfrm>
-            <a:prstGeom prst="rect">
-              <a:avLst/>
-            </a:prstGeom>
-            <a:solidFill>
-              <a:srgbClr val="00B050"/>
-            </a:solidFill>
-          </p:spPr>
-          <p:style>
-            <a:lnRef idx="2">
-              <a:schemeClr val="accent1">
-                <a:shade val="50000"/>
-              </a:schemeClr>
-            </a:lnRef>
-            <a:fillRef idx="1">
-              <a:schemeClr val="accent1"/>
-            </a:fillRef>
-            <a:effectRef idx="0">
-              <a:schemeClr val="accent1"/>
-            </a:effectRef>
-            <a:fontRef idx="minor">
-              <a:schemeClr val="lt1"/>
-            </a:fontRef>
-          </p:style>
-          <p:txBody>
-            <a:bodyPr rtlCol="0" anchor="ctr"/>
-            <a:lstStyle/>
-            <a:p>
-              <a:r>
-                <a:rPr lang="en-US" sz="1400" dirty="0" err="1" smtClean="0"/>
-                <a:t>DayofVisit</a:t>
-              </a:r>
-              <a:endParaRPr lang="en-US" sz="1400" dirty="0"/>
-            </a:p>
-          </p:txBody>
-        </p:sp>
-      </p:grpSp>
       <p:cxnSp>
         <p:nvCxnSpPr>
           <p:cNvPr id="181" name="Elbow Connector 180"/>
@@ -6604,8 +6474,8 @@
         </p:nvCxnSpPr>
         <p:spPr>
           <a:xfrm rot="16200000" flipH="1">
-            <a:off x="4638413" y="398886"/>
-            <a:ext cx="471262" cy="2083765"/>
+            <a:off x="4948238" y="708711"/>
+            <a:ext cx="679682" cy="1255695"/>
           </a:xfrm>
           <a:prstGeom prst="bentConnector3">
             <a:avLst>
@@ -6641,43 +6511,8 @@
         </p:nvCxnSpPr>
         <p:spPr>
           <a:xfrm rot="5400000">
-            <a:off x="5840316" y="1440769"/>
-            <a:ext cx="471262" cy="12700"/>
-          </a:xfrm>
-          <a:prstGeom prst="bentConnector3">
-            <a:avLst>
-              <a:gd name="adj1" fmla="val 50000"/>
-            </a:avLst>
-          </a:prstGeom>
-          <a:ln>
-            <a:tailEnd type="arrow"/>
-          </a:ln>
-        </p:spPr>
-        <p:style>
-          <a:lnRef idx="1">
-            <a:schemeClr val="accent1"/>
-          </a:lnRef>
-          <a:fillRef idx="0">
-            <a:schemeClr val="accent1"/>
-          </a:fillRef>
-          <a:effectRef idx="0">
-            <a:schemeClr val="accent1"/>
-          </a:effectRef>
-          <a:fontRef idx="minor">
-            <a:schemeClr val="tx1"/>
-          </a:fontRef>
-        </p:style>
-      </p:cxnSp>
-      <p:cxnSp>
-        <p:nvCxnSpPr>
-          <p:cNvPr id="187" name="Elbow Connector 186"/>
-          <p:cNvCxnSpPr/>
-          <p:nvPr/>
-        </p:nvCxnSpPr>
-        <p:spPr>
-          <a:xfrm rot="5400000">
-            <a:off x="7361614" y="106468"/>
-            <a:ext cx="471262" cy="2668603"/>
+            <a:off x="6272519" y="1003694"/>
+            <a:ext cx="685801" cy="664142"/>
           </a:xfrm>
           <a:prstGeom prst="bentConnector3">
             <a:avLst>

</xml_diff>